<commit_message>
updated slides and literature
</commit_message>
<xml_diff>
--- a/01-planning/ProjectOverview.pptx
+++ b/01-planning/ProjectOverview.pptx
@@ -3662,8 +3662,8 @@
         </p:nvSpPr>
         <p:spPr>
           <a:xfrm>
-            <a:off x="3979836" y="2220685"/>
-            <a:ext cx="3923414" cy="1015663"/>
+            <a:off x="3979836" y="2323466"/>
+            <a:ext cx="3923414" cy="1384995"/>
           </a:xfrm>
           <a:prstGeom prst="rect">
             <a:avLst/>
@@ -3709,6 +3709,26 @@
             <a:r>
               <a:rPr lang="en-US" sz="1200" dirty="0"/>
               <a:t>Low dimensional latent space.</a:t>
+            </a:r>
+          </a:p>
+          <a:p>
+            <a:pPr marL="285750" indent="-285750">
+              <a:buFontTx/>
+              <a:buChar char="-"/>
+            </a:pPr>
+            <a:r>
+              <a:rPr lang="en-US" sz="1200" dirty="0"/>
+              <a:t>Implicit neural representation.</a:t>
+            </a:r>
+          </a:p>
+          <a:p>
+            <a:pPr marL="285750" indent="-285750">
+              <a:buFontTx/>
+              <a:buChar char="-"/>
+            </a:pPr>
+            <a:r>
+              <a:rPr lang="en-US" sz="1200" dirty="0"/>
+              <a:t>Diffusion models.</a:t>
             </a:r>
           </a:p>
           <a:p>
@@ -4284,7 +4304,7 @@
         <p:spPr>
           <a:xfrm>
             <a:off x="7647474" y="1153632"/>
-            <a:ext cx="1412380" cy="0"/>
+            <a:ext cx="1456312" cy="33544"/>
           </a:xfrm>
           <a:prstGeom prst="straightConnector1">
             <a:avLst/>
@@ -4501,7 +4521,7 @@
         </p:nvGrpSpPr>
         <p:grpSpPr>
           <a:xfrm>
-            <a:off x="9059854" y="223283"/>
+            <a:off x="9103786" y="256827"/>
             <a:ext cx="2192055" cy="1860698"/>
             <a:chOff x="191387" y="74428"/>
             <a:chExt cx="2743200" cy="2328530"/>

</xml_diff>